<commit_message>
added matrix category table to figs ppt
</commit_message>
<xml_diff>
--- a/figure/figs.pptx
+++ b/figure/figs.pptx
@@ -205,7 +205,7 @@
           <a:p>
             <a:fld id="{671B42D5-CCC0-489C-A132-2167B492F51E}" type="datetimeFigureOut">
               <a:rPr lang="en-US" smtClean="0"/>
-              <a:t>8/28/2019</a:t>
+              <a:t>9/1/2019</a:t>
             </a:fld>
             <a:endParaRPr lang="en-US"/>
           </a:p>
@@ -960,7 +960,7 @@
           <a:p>
             <a:fld id="{07FC2FEA-EA4D-4E05-9692-DF795BF68E67}" type="datetimeFigureOut">
               <a:rPr lang="en-US" smtClean="0"/>
-              <a:t>8/28/2019</a:t>
+              <a:t>9/1/2019</a:t>
             </a:fld>
             <a:endParaRPr lang="en-US"/>
           </a:p>
@@ -1158,7 +1158,7 @@
           <a:p>
             <a:fld id="{07FC2FEA-EA4D-4E05-9692-DF795BF68E67}" type="datetimeFigureOut">
               <a:rPr lang="en-US" smtClean="0"/>
-              <a:t>8/28/2019</a:t>
+              <a:t>9/1/2019</a:t>
             </a:fld>
             <a:endParaRPr lang="en-US"/>
           </a:p>
@@ -1366,7 +1366,7 @@
           <a:p>
             <a:fld id="{07FC2FEA-EA4D-4E05-9692-DF795BF68E67}" type="datetimeFigureOut">
               <a:rPr lang="en-US" smtClean="0"/>
-              <a:t>8/28/2019</a:t>
+              <a:t>9/1/2019</a:t>
             </a:fld>
             <a:endParaRPr lang="en-US"/>
           </a:p>
@@ -1564,7 +1564,7 @@
           <a:p>
             <a:fld id="{07FC2FEA-EA4D-4E05-9692-DF795BF68E67}" type="datetimeFigureOut">
               <a:rPr lang="en-US" smtClean="0"/>
-              <a:t>8/28/2019</a:t>
+              <a:t>9/1/2019</a:t>
             </a:fld>
             <a:endParaRPr lang="en-US"/>
           </a:p>
@@ -1839,7 +1839,7 @@
           <a:p>
             <a:fld id="{07FC2FEA-EA4D-4E05-9692-DF795BF68E67}" type="datetimeFigureOut">
               <a:rPr lang="en-US" smtClean="0"/>
-              <a:t>8/28/2019</a:t>
+              <a:t>9/1/2019</a:t>
             </a:fld>
             <a:endParaRPr lang="en-US"/>
           </a:p>
@@ -2104,7 +2104,7 @@
           <a:p>
             <a:fld id="{07FC2FEA-EA4D-4E05-9692-DF795BF68E67}" type="datetimeFigureOut">
               <a:rPr lang="en-US" smtClean="0"/>
-              <a:t>8/28/2019</a:t>
+              <a:t>9/1/2019</a:t>
             </a:fld>
             <a:endParaRPr lang="en-US"/>
           </a:p>
@@ -2516,7 +2516,7 @@
           <a:p>
             <a:fld id="{07FC2FEA-EA4D-4E05-9692-DF795BF68E67}" type="datetimeFigureOut">
               <a:rPr lang="en-US" smtClean="0"/>
-              <a:t>8/28/2019</a:t>
+              <a:t>9/1/2019</a:t>
             </a:fld>
             <a:endParaRPr lang="en-US"/>
           </a:p>
@@ -2657,7 +2657,7 @@
           <a:p>
             <a:fld id="{07FC2FEA-EA4D-4E05-9692-DF795BF68E67}" type="datetimeFigureOut">
               <a:rPr lang="en-US" smtClean="0"/>
-              <a:t>8/28/2019</a:t>
+              <a:t>9/1/2019</a:t>
             </a:fld>
             <a:endParaRPr lang="en-US"/>
           </a:p>
@@ -2770,7 +2770,7 @@
           <a:p>
             <a:fld id="{07FC2FEA-EA4D-4E05-9692-DF795BF68E67}" type="datetimeFigureOut">
               <a:rPr lang="en-US" smtClean="0"/>
-              <a:t>8/28/2019</a:t>
+              <a:t>9/1/2019</a:t>
             </a:fld>
             <a:endParaRPr lang="en-US"/>
           </a:p>
@@ -3081,7 +3081,7 @@
           <a:p>
             <a:fld id="{07FC2FEA-EA4D-4E05-9692-DF795BF68E67}" type="datetimeFigureOut">
               <a:rPr lang="en-US" smtClean="0"/>
-              <a:t>8/28/2019</a:t>
+              <a:t>9/1/2019</a:t>
             </a:fld>
             <a:endParaRPr lang="en-US"/>
           </a:p>
@@ -3369,7 +3369,7 @@
           <a:p>
             <a:fld id="{07FC2FEA-EA4D-4E05-9692-DF795BF68E67}" type="datetimeFigureOut">
               <a:rPr lang="en-US" smtClean="0"/>
-              <a:t>8/28/2019</a:t>
+              <a:t>9/1/2019</a:t>
             </a:fld>
             <a:endParaRPr lang="en-US"/>
           </a:p>
@@ -3610,7 +3610,7 @@
           <a:p>
             <a:fld id="{07FC2FEA-EA4D-4E05-9692-DF795BF68E67}" type="datetimeFigureOut">
               <a:rPr lang="en-US" smtClean="0"/>
-              <a:t>8/28/2019</a:t>
+              <a:t>9/1/2019</a:t>
             </a:fld>
             <a:endParaRPr lang="en-US"/>
           </a:p>
@@ -11000,56 +11000,1771 @@
           <a:chExt cx="0" cy="0"/>
         </a:xfrm>
       </p:grpSpPr>
-      <p:sp>
-        <p:nvSpPr>
-          <p:cNvPr id="2" name="Title 1">
+      <p:graphicFrame>
+        <p:nvGraphicFramePr>
+          <p:cNvPr id="4" name="Table 3">
             <a:extLst>
               <a:ext uri="{FF2B5EF4-FFF2-40B4-BE49-F238E27FC236}">
-                <a16:creationId xmlns:a16="http://schemas.microsoft.com/office/drawing/2014/main" id="{F97D7FE6-561C-4AC5-A0D7-F42B3B38A397}"/>
+                <a16:creationId xmlns:a16="http://schemas.microsoft.com/office/drawing/2014/main" id="{A653C29C-48D2-4C6F-943F-038C7614F62B}"/>
               </a:ext>
             </a:extLst>
           </p:cNvPr>
-          <p:cNvSpPr>
-            <a:spLocks noGrp="1"/>
-          </p:cNvSpPr>
+          <p:cNvGraphicFramePr>
+            <a:graphicFrameLocks noGrp="1"/>
+          </p:cNvGraphicFramePr>
           <p:nvPr>
-            <p:ph type="title"/>
+            <p:extLst>
+              <p:ext uri="{D42A27DB-BD31-4B8C-83A1-F6EECF244321}">
+                <p14:modId xmlns:p14="http://schemas.microsoft.com/office/powerpoint/2010/main" val="182273194"/>
+              </p:ext>
+            </p:extLst>
           </p:nvPr>
-        </p:nvSpPr>
-        <p:spPr/>
-        <p:txBody>
-          <a:bodyPr/>
-          <a:lstStyle/>
-          <a:p>
-            <a:endParaRPr lang="en-US"/>
-          </a:p>
-        </p:txBody>
-      </p:sp>
-      <p:sp>
-        <p:nvSpPr>
-          <p:cNvPr id="3" name="Content Placeholder 2">
-            <a:extLst>
-              <a:ext uri="{FF2B5EF4-FFF2-40B4-BE49-F238E27FC236}">
-                <a16:creationId xmlns:a16="http://schemas.microsoft.com/office/drawing/2014/main" id="{C8181026-D1F4-4BA5-988A-8C86CBCAD166}"/>
-              </a:ext>
-            </a:extLst>
-          </p:cNvPr>
-          <p:cNvSpPr>
-            <a:spLocks noGrp="1"/>
-          </p:cNvSpPr>
-          <p:nvPr>
-            <p:ph idx="1"/>
-          </p:nvPr>
-        </p:nvSpPr>
-        <p:spPr/>
-        <p:txBody>
-          <a:bodyPr/>
-          <a:lstStyle/>
-          <a:p>
-            <a:endParaRPr lang="en-US"/>
-          </a:p>
-        </p:txBody>
-      </p:sp>
+        </p:nvGraphicFramePr>
+        <p:xfrm>
+          <a:off x="2032000" y="719666"/>
+          <a:ext cx="6298270" cy="2214880"/>
+        </p:xfrm>
+        <a:graphic>
+          <a:graphicData uri="http://schemas.openxmlformats.org/drawingml/2006/table">
+            <a:tbl>
+              <a:tblPr firstRow="1" bandRow="1">
+                <a:tableStyleId>{5C22544A-7EE6-4342-B048-85BDC9FD1C3A}</a:tableStyleId>
+              </a:tblPr>
+              <a:tblGrid>
+                <a:gridCol w="1432653">
+                  <a:extLst>
+                    <a:ext uri="{9D8B030D-6E8A-4147-A177-3AD203B41FA5}">
+                      <a16:colId xmlns:a16="http://schemas.microsoft.com/office/drawing/2014/main" val="1615647681"/>
+                    </a:ext>
+                  </a:extLst>
+                </a:gridCol>
+                <a:gridCol w="1086655">
+                  <a:extLst>
+                    <a:ext uri="{9D8B030D-6E8A-4147-A177-3AD203B41FA5}">
+                      <a16:colId xmlns:a16="http://schemas.microsoft.com/office/drawing/2014/main" val="1963261515"/>
+                    </a:ext>
+                  </a:extLst>
+                </a:gridCol>
+                <a:gridCol w="1259654">
+                  <a:extLst>
+                    <a:ext uri="{9D8B030D-6E8A-4147-A177-3AD203B41FA5}">
+                      <a16:colId xmlns:a16="http://schemas.microsoft.com/office/drawing/2014/main" val="2393708828"/>
+                    </a:ext>
+                  </a:extLst>
+                </a:gridCol>
+                <a:gridCol w="1259654">
+                  <a:extLst>
+                    <a:ext uri="{9D8B030D-6E8A-4147-A177-3AD203B41FA5}">
+                      <a16:colId xmlns:a16="http://schemas.microsoft.com/office/drawing/2014/main" val="205851259"/>
+                    </a:ext>
+                  </a:extLst>
+                </a:gridCol>
+                <a:gridCol w="1259654">
+                  <a:extLst>
+                    <a:ext uri="{9D8B030D-6E8A-4147-A177-3AD203B41FA5}">
+                      <a16:colId xmlns:a16="http://schemas.microsoft.com/office/drawing/2014/main" val="3420622788"/>
+                    </a:ext>
+                  </a:extLst>
+                </a:gridCol>
+              </a:tblGrid>
+              <a:tr h="370840">
+                <a:tc rowSpan="2">
+                  <a:txBody>
+                    <a:bodyPr/>
+                    <a:lstStyle/>
+                    <a:p>
+                      <a:pPr algn="ctr"/>
+                      <a:r>
+                        <a:rPr lang="en-US" dirty="0">
+                          <a:solidFill>
+                            <a:schemeClr val="tx1"/>
+                          </a:solidFill>
+                          <a:latin typeface="Times New Roman" panose="02020603050405020304" pitchFamily="18" charset="0"/>
+                          <a:cs typeface="Times New Roman" panose="02020603050405020304" pitchFamily="18" charset="0"/>
+                        </a:rPr>
+                        <a:t>Chlorophyll outcomes</a:t>
+                      </a:r>
+                    </a:p>
+                  </a:txBody>
+                  <a:tcPr>
+                    <a:lnL w="12700" cap="flat" cmpd="sng" algn="ctr">
+                      <a:solidFill>
+                        <a:schemeClr val="tx1"/>
+                      </a:solidFill>
+                      <a:prstDash val="solid"/>
+                      <a:round/>
+                      <a:headEnd type="none" w="med" len="med"/>
+                      <a:tailEnd type="none" w="med" len="med"/>
+                    </a:lnL>
+                    <a:lnR w="12700" cap="flat" cmpd="sng" algn="ctr">
+                      <a:solidFill>
+                        <a:schemeClr val="tx1"/>
+                      </a:solidFill>
+                      <a:prstDash val="solid"/>
+                      <a:round/>
+                      <a:headEnd type="none" w="med" len="med"/>
+                      <a:tailEnd type="none" w="med" len="med"/>
+                    </a:lnR>
+                    <a:lnT w="12700" cap="flat" cmpd="sng" algn="ctr">
+                      <a:solidFill>
+                        <a:schemeClr val="tx1"/>
+                      </a:solidFill>
+                      <a:prstDash val="solid"/>
+                      <a:round/>
+                      <a:headEnd type="none" w="med" len="med"/>
+                      <a:tailEnd type="none" w="med" len="med"/>
+                    </a:lnT>
+                    <a:lnB w="12700" cap="flat" cmpd="sng" algn="ctr">
+                      <a:solidFill>
+                        <a:schemeClr val="tx1"/>
+                      </a:solidFill>
+                      <a:prstDash val="solid"/>
+                      <a:round/>
+                      <a:headEnd type="none" w="med" len="med"/>
+                      <a:tailEnd type="none" w="med" len="med"/>
+                    </a:lnB>
+                    <a:noFill/>
+                  </a:tcPr>
+                </a:tc>
+                <a:tc gridSpan="4">
+                  <a:txBody>
+                    <a:bodyPr/>
+                    <a:lstStyle/>
+                    <a:p>
+                      <a:pPr algn="ctr"/>
+                      <a:r>
+                        <a:rPr lang="en-US" dirty="0">
+                          <a:solidFill>
+                            <a:schemeClr val="tx1"/>
+                          </a:solidFill>
+                          <a:latin typeface="Times New Roman" panose="02020603050405020304" pitchFamily="18" charset="0"/>
+                          <a:cs typeface="Times New Roman" panose="02020603050405020304" pitchFamily="18" charset="0"/>
+                        </a:rPr>
+                        <a:t>Light attenuation outcomes</a:t>
+                      </a:r>
+                    </a:p>
+                  </a:txBody>
+                  <a:tcPr>
+                    <a:lnL w="12700" cap="flat" cmpd="sng" algn="ctr">
+                      <a:solidFill>
+                        <a:schemeClr val="tx1"/>
+                      </a:solidFill>
+                      <a:prstDash val="solid"/>
+                      <a:round/>
+                      <a:headEnd type="none" w="med" len="med"/>
+                      <a:tailEnd type="none" w="med" len="med"/>
+                    </a:lnL>
+                    <a:lnR w="12700" cap="flat" cmpd="sng" algn="ctr">
+                      <a:solidFill>
+                        <a:schemeClr val="tx1"/>
+                      </a:solidFill>
+                      <a:prstDash val="solid"/>
+                      <a:round/>
+                      <a:headEnd type="none" w="med" len="med"/>
+                      <a:tailEnd type="none" w="med" len="med"/>
+                    </a:lnR>
+                    <a:lnT w="12700" cap="flat" cmpd="sng" algn="ctr">
+                      <a:solidFill>
+                        <a:schemeClr val="tx1"/>
+                      </a:solidFill>
+                      <a:prstDash val="solid"/>
+                      <a:round/>
+                      <a:headEnd type="none" w="med" len="med"/>
+                      <a:tailEnd type="none" w="med" len="med"/>
+                    </a:lnT>
+                    <a:lnB w="12700" cap="flat" cmpd="sng" algn="ctr">
+                      <a:solidFill>
+                        <a:schemeClr val="tx1"/>
+                      </a:solidFill>
+                      <a:prstDash val="solid"/>
+                      <a:round/>
+                      <a:headEnd type="none" w="med" len="med"/>
+                      <a:tailEnd type="none" w="med" len="med"/>
+                    </a:lnB>
+                    <a:noFill/>
+                  </a:tcPr>
+                </a:tc>
+                <a:tc hMerge="1">
+                  <a:txBody>
+                    <a:bodyPr/>
+                    <a:lstStyle/>
+                    <a:p>
+                      <a:endParaRPr lang="en-US" dirty="0"/>
+                    </a:p>
+                  </a:txBody>
+                  <a:tcPr/>
+                </a:tc>
+                <a:tc hMerge="1">
+                  <a:txBody>
+                    <a:bodyPr/>
+                    <a:lstStyle/>
+                    <a:p>
+                      <a:endParaRPr lang="en-US" dirty="0"/>
+                    </a:p>
+                  </a:txBody>
+                  <a:tcPr/>
+                </a:tc>
+                <a:tc hMerge="1">
+                  <a:txBody>
+                    <a:bodyPr/>
+                    <a:lstStyle/>
+                    <a:p>
+                      <a:endParaRPr lang="en-US" dirty="0"/>
+                    </a:p>
+                  </a:txBody>
+                  <a:tcPr/>
+                </a:tc>
+                <a:extLst>
+                  <a:ext uri="{0D108BD9-81ED-4DB2-BD59-A6C34878D82A}">
+                    <a16:rowId xmlns:a16="http://schemas.microsoft.com/office/drawing/2014/main" val="3064768211"/>
+                  </a:ext>
+                </a:extLst>
+              </a:tr>
+              <a:tr h="370840">
+                <a:tc vMerge="1">
+                  <a:txBody>
+                    <a:bodyPr/>
+                    <a:lstStyle/>
+                    <a:p>
+                      <a:endParaRPr lang="en-US" dirty="0"/>
+                    </a:p>
+                  </a:txBody>
+                  <a:tcPr/>
+                </a:tc>
+                <a:tc>
+                  <a:txBody>
+                    <a:bodyPr/>
+                    <a:lstStyle/>
+                    <a:p>
+                      <a:pPr algn="ctr"/>
+                      <a:r>
+                        <a:rPr lang="en-US" dirty="0">
+                          <a:solidFill>
+                            <a:schemeClr val="tx1"/>
+                          </a:solidFill>
+                          <a:latin typeface="Times New Roman" panose="02020603050405020304" pitchFamily="18" charset="0"/>
+                          <a:cs typeface="Times New Roman" panose="02020603050405020304" pitchFamily="18" charset="0"/>
+                        </a:rPr>
+                        <a:t>0</a:t>
+                      </a:r>
+                    </a:p>
+                  </a:txBody>
+                  <a:tcPr>
+                    <a:lnL w="12700" cap="flat" cmpd="sng" algn="ctr">
+                      <a:solidFill>
+                        <a:schemeClr val="tx1"/>
+                      </a:solidFill>
+                      <a:prstDash val="solid"/>
+                      <a:round/>
+                      <a:headEnd type="none" w="med" len="med"/>
+                      <a:tailEnd type="none" w="med" len="med"/>
+                    </a:lnL>
+                    <a:lnR w="12700" cap="flat" cmpd="sng" algn="ctr">
+                      <a:solidFill>
+                        <a:schemeClr val="tx1"/>
+                      </a:solidFill>
+                      <a:prstDash val="solid"/>
+                      <a:round/>
+                      <a:headEnd type="none" w="med" len="med"/>
+                      <a:tailEnd type="none" w="med" len="med"/>
+                    </a:lnR>
+                    <a:lnT w="12700" cap="flat" cmpd="sng" algn="ctr">
+                      <a:solidFill>
+                        <a:schemeClr val="tx1"/>
+                      </a:solidFill>
+                      <a:prstDash val="solid"/>
+                      <a:round/>
+                      <a:headEnd type="none" w="med" len="med"/>
+                      <a:tailEnd type="none" w="med" len="med"/>
+                    </a:lnT>
+                    <a:lnB w="12700" cap="flat" cmpd="sng" algn="ctr">
+                      <a:solidFill>
+                        <a:schemeClr val="tx1"/>
+                      </a:solidFill>
+                      <a:prstDash val="solid"/>
+                      <a:round/>
+                      <a:headEnd type="none" w="med" len="med"/>
+                      <a:tailEnd type="none" w="med" len="med"/>
+                    </a:lnB>
+                    <a:noFill/>
+                  </a:tcPr>
+                </a:tc>
+                <a:tc>
+                  <a:txBody>
+                    <a:bodyPr/>
+                    <a:lstStyle/>
+                    <a:p>
+                      <a:pPr algn="ctr"/>
+                      <a:r>
+                        <a:rPr lang="en-US" dirty="0">
+                          <a:solidFill>
+                            <a:schemeClr val="tx1"/>
+                          </a:solidFill>
+                          <a:latin typeface="Times New Roman" panose="02020603050405020304" pitchFamily="18" charset="0"/>
+                          <a:cs typeface="Times New Roman" panose="02020603050405020304" pitchFamily="18" charset="0"/>
+                        </a:rPr>
+                        <a:t>1</a:t>
+                      </a:r>
+                    </a:p>
+                  </a:txBody>
+                  <a:tcPr>
+                    <a:lnL w="12700" cap="flat" cmpd="sng" algn="ctr">
+                      <a:solidFill>
+                        <a:schemeClr val="tx1"/>
+                      </a:solidFill>
+                      <a:prstDash val="solid"/>
+                      <a:round/>
+                      <a:headEnd type="none" w="med" len="med"/>
+                      <a:tailEnd type="none" w="med" len="med"/>
+                    </a:lnL>
+                    <a:lnR w="12700" cap="flat" cmpd="sng" algn="ctr">
+                      <a:solidFill>
+                        <a:schemeClr val="tx1"/>
+                      </a:solidFill>
+                      <a:prstDash val="solid"/>
+                      <a:round/>
+                      <a:headEnd type="none" w="med" len="med"/>
+                      <a:tailEnd type="none" w="med" len="med"/>
+                    </a:lnR>
+                    <a:lnT w="12700" cap="flat" cmpd="sng" algn="ctr">
+                      <a:solidFill>
+                        <a:schemeClr val="tx1"/>
+                      </a:solidFill>
+                      <a:prstDash val="solid"/>
+                      <a:round/>
+                      <a:headEnd type="none" w="med" len="med"/>
+                      <a:tailEnd type="none" w="med" len="med"/>
+                    </a:lnT>
+                    <a:lnB w="12700" cap="flat" cmpd="sng" algn="ctr">
+                      <a:solidFill>
+                        <a:schemeClr val="tx1"/>
+                      </a:solidFill>
+                      <a:prstDash val="solid"/>
+                      <a:round/>
+                      <a:headEnd type="none" w="med" len="med"/>
+                      <a:tailEnd type="none" w="med" len="med"/>
+                    </a:lnB>
+                    <a:noFill/>
+                  </a:tcPr>
+                </a:tc>
+                <a:tc>
+                  <a:txBody>
+                    <a:bodyPr/>
+                    <a:lstStyle/>
+                    <a:p>
+                      <a:pPr algn="ctr"/>
+                      <a:r>
+                        <a:rPr lang="en-US" dirty="0">
+                          <a:solidFill>
+                            <a:schemeClr val="tx1"/>
+                          </a:solidFill>
+                          <a:latin typeface="Times New Roman" panose="02020603050405020304" pitchFamily="18" charset="0"/>
+                          <a:cs typeface="Times New Roman" panose="02020603050405020304" pitchFamily="18" charset="0"/>
+                        </a:rPr>
+                        <a:t>2</a:t>
+                      </a:r>
+                    </a:p>
+                  </a:txBody>
+                  <a:tcPr>
+                    <a:lnL w="12700" cap="flat" cmpd="sng" algn="ctr">
+                      <a:solidFill>
+                        <a:schemeClr val="tx1"/>
+                      </a:solidFill>
+                      <a:prstDash val="solid"/>
+                      <a:round/>
+                      <a:headEnd type="none" w="med" len="med"/>
+                      <a:tailEnd type="none" w="med" len="med"/>
+                    </a:lnL>
+                    <a:lnR w="12700" cap="flat" cmpd="sng" algn="ctr">
+                      <a:solidFill>
+                        <a:schemeClr val="tx1"/>
+                      </a:solidFill>
+                      <a:prstDash val="solid"/>
+                      <a:round/>
+                      <a:headEnd type="none" w="med" len="med"/>
+                      <a:tailEnd type="none" w="med" len="med"/>
+                    </a:lnR>
+                    <a:lnT w="12700" cap="flat" cmpd="sng" algn="ctr">
+                      <a:solidFill>
+                        <a:schemeClr val="tx1"/>
+                      </a:solidFill>
+                      <a:prstDash val="solid"/>
+                      <a:round/>
+                      <a:headEnd type="none" w="med" len="med"/>
+                      <a:tailEnd type="none" w="med" len="med"/>
+                    </a:lnT>
+                    <a:lnB w="12700" cap="flat" cmpd="sng" algn="ctr">
+                      <a:solidFill>
+                        <a:schemeClr val="tx1"/>
+                      </a:solidFill>
+                      <a:prstDash val="solid"/>
+                      <a:round/>
+                      <a:headEnd type="none" w="med" len="med"/>
+                      <a:tailEnd type="none" w="med" len="med"/>
+                    </a:lnB>
+                    <a:noFill/>
+                  </a:tcPr>
+                </a:tc>
+                <a:tc>
+                  <a:txBody>
+                    <a:bodyPr/>
+                    <a:lstStyle/>
+                    <a:p>
+                      <a:pPr algn="ctr"/>
+                      <a:r>
+                        <a:rPr lang="en-US" dirty="0">
+                          <a:solidFill>
+                            <a:schemeClr val="tx1"/>
+                          </a:solidFill>
+                          <a:latin typeface="Times New Roman" panose="02020603050405020304" pitchFamily="18" charset="0"/>
+                          <a:cs typeface="Times New Roman" panose="02020603050405020304" pitchFamily="18" charset="0"/>
+                        </a:rPr>
+                        <a:t>3</a:t>
+                      </a:r>
+                    </a:p>
+                  </a:txBody>
+                  <a:tcPr>
+                    <a:lnL w="12700" cap="flat" cmpd="sng" algn="ctr">
+                      <a:solidFill>
+                        <a:schemeClr val="tx1"/>
+                      </a:solidFill>
+                      <a:prstDash val="solid"/>
+                      <a:round/>
+                      <a:headEnd type="none" w="med" len="med"/>
+                      <a:tailEnd type="none" w="med" len="med"/>
+                    </a:lnL>
+                    <a:lnR w="12700" cap="flat" cmpd="sng" algn="ctr">
+                      <a:solidFill>
+                        <a:schemeClr val="tx1"/>
+                      </a:solidFill>
+                      <a:prstDash val="solid"/>
+                      <a:round/>
+                      <a:headEnd type="none" w="med" len="med"/>
+                      <a:tailEnd type="none" w="med" len="med"/>
+                    </a:lnR>
+                    <a:lnT w="12700" cap="flat" cmpd="sng" algn="ctr">
+                      <a:solidFill>
+                        <a:schemeClr val="tx1"/>
+                      </a:solidFill>
+                      <a:prstDash val="solid"/>
+                      <a:round/>
+                      <a:headEnd type="none" w="med" len="med"/>
+                      <a:tailEnd type="none" w="med" len="med"/>
+                    </a:lnT>
+                    <a:lnB w="12700" cap="flat" cmpd="sng" algn="ctr">
+                      <a:solidFill>
+                        <a:schemeClr val="tx1"/>
+                      </a:solidFill>
+                      <a:prstDash val="solid"/>
+                      <a:round/>
+                      <a:headEnd type="none" w="med" len="med"/>
+                      <a:tailEnd type="none" w="med" len="med"/>
+                    </a:lnB>
+                    <a:noFill/>
+                  </a:tcPr>
+                </a:tc>
+                <a:extLst>
+                  <a:ext uri="{0D108BD9-81ED-4DB2-BD59-A6C34878D82A}">
+                    <a16:rowId xmlns:a16="http://schemas.microsoft.com/office/drawing/2014/main" val="3049134006"/>
+                  </a:ext>
+                </a:extLst>
+              </a:tr>
+              <a:tr h="370840">
+                <a:tc>
+                  <a:txBody>
+                    <a:bodyPr/>
+                    <a:lstStyle/>
+                    <a:p>
+                      <a:pPr algn="ctr"/>
+                      <a:r>
+                        <a:rPr lang="en-US" dirty="0">
+                          <a:solidFill>
+                            <a:schemeClr val="tx1"/>
+                          </a:solidFill>
+                          <a:latin typeface="Times New Roman" panose="02020603050405020304" pitchFamily="18" charset="0"/>
+                          <a:cs typeface="Times New Roman" panose="02020603050405020304" pitchFamily="18" charset="0"/>
+                        </a:rPr>
+                        <a:t>0</a:t>
+                      </a:r>
+                    </a:p>
+                  </a:txBody>
+                  <a:tcPr>
+                    <a:lnL w="12700" cap="flat" cmpd="sng" algn="ctr">
+                      <a:solidFill>
+                        <a:schemeClr val="tx1"/>
+                      </a:solidFill>
+                      <a:prstDash val="solid"/>
+                      <a:round/>
+                      <a:headEnd type="none" w="med" len="med"/>
+                      <a:tailEnd type="none" w="med" len="med"/>
+                    </a:lnL>
+                    <a:lnR w="12700" cap="flat" cmpd="sng" algn="ctr">
+                      <a:solidFill>
+                        <a:schemeClr val="tx1"/>
+                      </a:solidFill>
+                      <a:prstDash val="solid"/>
+                      <a:round/>
+                      <a:headEnd type="none" w="med" len="med"/>
+                      <a:tailEnd type="none" w="med" len="med"/>
+                    </a:lnR>
+                    <a:lnT w="12700" cap="flat" cmpd="sng" algn="ctr">
+                      <a:solidFill>
+                        <a:schemeClr val="tx1"/>
+                      </a:solidFill>
+                      <a:prstDash val="solid"/>
+                      <a:round/>
+                      <a:headEnd type="none" w="med" len="med"/>
+                      <a:tailEnd type="none" w="med" len="med"/>
+                    </a:lnT>
+                    <a:lnB w="12700" cap="flat" cmpd="sng" algn="ctr">
+                      <a:solidFill>
+                        <a:schemeClr val="tx1"/>
+                      </a:solidFill>
+                      <a:prstDash val="solid"/>
+                      <a:round/>
+                      <a:headEnd type="none" w="med" len="med"/>
+                      <a:tailEnd type="none" w="med" len="med"/>
+                    </a:lnB>
+                    <a:noFill/>
+                  </a:tcPr>
+                </a:tc>
+                <a:tc>
+                  <a:txBody>
+                    <a:bodyPr/>
+                    <a:lstStyle/>
+                    <a:p>
+                      <a:pPr algn="ctr"/>
+                      <a:r>
+                        <a:rPr lang="en-US" dirty="0">
+                          <a:solidFill>
+                            <a:schemeClr val="tx1"/>
+                          </a:solidFill>
+                          <a:latin typeface="Times New Roman" panose="02020603050405020304" pitchFamily="18" charset="0"/>
+                          <a:cs typeface="Times New Roman" panose="02020603050405020304" pitchFamily="18" charset="0"/>
+                        </a:rPr>
+                        <a:t>Green</a:t>
+                      </a:r>
+                    </a:p>
+                  </a:txBody>
+                  <a:tcPr>
+                    <a:lnL w="12700" cap="flat" cmpd="sng" algn="ctr">
+                      <a:solidFill>
+                        <a:schemeClr val="tx1"/>
+                      </a:solidFill>
+                      <a:prstDash val="solid"/>
+                      <a:round/>
+                      <a:headEnd type="none" w="med" len="med"/>
+                      <a:tailEnd type="none" w="med" len="med"/>
+                    </a:lnL>
+                    <a:lnR w="12700" cap="flat" cmpd="sng" algn="ctr">
+                      <a:solidFill>
+                        <a:schemeClr val="tx1"/>
+                      </a:solidFill>
+                      <a:prstDash val="solid"/>
+                      <a:round/>
+                      <a:headEnd type="none" w="med" len="med"/>
+                      <a:tailEnd type="none" w="med" len="med"/>
+                    </a:lnR>
+                    <a:lnT w="12700" cap="flat" cmpd="sng" algn="ctr">
+                      <a:solidFill>
+                        <a:schemeClr val="tx1"/>
+                      </a:solidFill>
+                      <a:prstDash val="solid"/>
+                      <a:round/>
+                      <a:headEnd type="none" w="med" len="med"/>
+                      <a:tailEnd type="none" w="med" len="med"/>
+                    </a:lnT>
+                    <a:lnB w="12700" cap="flat" cmpd="sng" algn="ctr">
+                      <a:solidFill>
+                        <a:schemeClr val="tx1"/>
+                      </a:solidFill>
+                      <a:prstDash val="solid"/>
+                      <a:round/>
+                      <a:headEnd type="none" w="med" len="med"/>
+                      <a:tailEnd type="none" w="med" len="med"/>
+                    </a:lnB>
+                    <a:solidFill>
+                      <a:srgbClr val="00B050"/>
+                    </a:solidFill>
+                  </a:tcPr>
+                </a:tc>
+                <a:tc>
+                  <a:txBody>
+                    <a:bodyPr/>
+                    <a:lstStyle/>
+                    <a:p>
+                      <a:pPr algn="ctr"/>
+                      <a:r>
+                        <a:rPr lang="en-US" dirty="0">
+                          <a:solidFill>
+                            <a:schemeClr val="tx1"/>
+                          </a:solidFill>
+                          <a:latin typeface="Times New Roman" panose="02020603050405020304" pitchFamily="18" charset="0"/>
+                          <a:cs typeface="Times New Roman" panose="02020603050405020304" pitchFamily="18" charset="0"/>
+                        </a:rPr>
+                        <a:t>Yellow</a:t>
+                      </a:r>
+                    </a:p>
+                  </a:txBody>
+                  <a:tcPr>
+                    <a:lnL w="12700" cap="flat" cmpd="sng" algn="ctr">
+                      <a:solidFill>
+                        <a:schemeClr val="tx1"/>
+                      </a:solidFill>
+                      <a:prstDash val="solid"/>
+                      <a:round/>
+                      <a:headEnd type="none" w="med" len="med"/>
+                      <a:tailEnd type="none" w="med" len="med"/>
+                    </a:lnL>
+                    <a:lnR w="12700" cap="flat" cmpd="sng" algn="ctr">
+                      <a:solidFill>
+                        <a:schemeClr val="tx1"/>
+                      </a:solidFill>
+                      <a:prstDash val="solid"/>
+                      <a:round/>
+                      <a:headEnd type="none" w="med" len="med"/>
+                      <a:tailEnd type="none" w="med" len="med"/>
+                    </a:lnR>
+                    <a:lnT w="12700" cap="flat" cmpd="sng" algn="ctr">
+                      <a:solidFill>
+                        <a:schemeClr val="tx1"/>
+                      </a:solidFill>
+                      <a:prstDash val="solid"/>
+                      <a:round/>
+                      <a:headEnd type="none" w="med" len="med"/>
+                      <a:tailEnd type="none" w="med" len="med"/>
+                    </a:lnT>
+                    <a:lnB w="12700" cap="flat" cmpd="sng" algn="ctr">
+                      <a:solidFill>
+                        <a:schemeClr val="tx1"/>
+                      </a:solidFill>
+                      <a:prstDash val="solid"/>
+                      <a:round/>
+                      <a:headEnd type="none" w="med" len="med"/>
+                      <a:tailEnd type="none" w="med" len="med"/>
+                    </a:lnB>
+                    <a:solidFill>
+                      <a:srgbClr val="FFFF00"/>
+                    </a:solidFill>
+                  </a:tcPr>
+                </a:tc>
+                <a:tc>
+                  <a:txBody>
+                    <a:bodyPr/>
+                    <a:lstStyle/>
+                    <a:p>
+                      <a:pPr algn="ctr"/>
+                      <a:r>
+                        <a:rPr lang="en-US" dirty="0">
+                          <a:solidFill>
+                            <a:schemeClr val="tx1"/>
+                          </a:solidFill>
+                          <a:latin typeface="Times New Roman" panose="02020603050405020304" pitchFamily="18" charset="0"/>
+                          <a:cs typeface="Times New Roman" panose="02020603050405020304" pitchFamily="18" charset="0"/>
+                        </a:rPr>
+                        <a:t>Yellow</a:t>
+                      </a:r>
+                    </a:p>
+                  </a:txBody>
+                  <a:tcPr>
+                    <a:lnL w="12700" cap="flat" cmpd="sng" algn="ctr">
+                      <a:solidFill>
+                        <a:schemeClr val="tx1"/>
+                      </a:solidFill>
+                      <a:prstDash val="solid"/>
+                      <a:round/>
+                      <a:headEnd type="none" w="med" len="med"/>
+                      <a:tailEnd type="none" w="med" len="med"/>
+                    </a:lnL>
+                    <a:lnR w="12700" cap="flat" cmpd="sng" algn="ctr">
+                      <a:solidFill>
+                        <a:schemeClr val="tx1"/>
+                      </a:solidFill>
+                      <a:prstDash val="solid"/>
+                      <a:round/>
+                      <a:headEnd type="none" w="med" len="med"/>
+                      <a:tailEnd type="none" w="med" len="med"/>
+                    </a:lnR>
+                    <a:lnT w="12700" cap="flat" cmpd="sng" algn="ctr">
+                      <a:solidFill>
+                        <a:schemeClr val="tx1"/>
+                      </a:solidFill>
+                      <a:prstDash val="solid"/>
+                      <a:round/>
+                      <a:headEnd type="none" w="med" len="med"/>
+                      <a:tailEnd type="none" w="med" len="med"/>
+                    </a:lnT>
+                    <a:lnB w="12700" cap="flat" cmpd="sng" algn="ctr">
+                      <a:solidFill>
+                        <a:schemeClr val="tx1"/>
+                      </a:solidFill>
+                      <a:prstDash val="solid"/>
+                      <a:round/>
+                      <a:headEnd type="none" w="med" len="med"/>
+                      <a:tailEnd type="none" w="med" len="med"/>
+                    </a:lnB>
+                    <a:solidFill>
+                      <a:srgbClr val="FFFF00"/>
+                    </a:solidFill>
+                  </a:tcPr>
+                </a:tc>
+                <a:tc>
+                  <a:txBody>
+                    <a:bodyPr/>
+                    <a:lstStyle/>
+                    <a:p>
+                      <a:pPr algn="ctr"/>
+                      <a:r>
+                        <a:rPr lang="en-US" dirty="0">
+                          <a:solidFill>
+                            <a:schemeClr val="tx1"/>
+                          </a:solidFill>
+                          <a:latin typeface="Times New Roman" panose="02020603050405020304" pitchFamily="18" charset="0"/>
+                          <a:cs typeface="Times New Roman" panose="02020603050405020304" pitchFamily="18" charset="0"/>
+                        </a:rPr>
+                        <a:t>Yellow</a:t>
+                      </a:r>
+                    </a:p>
+                  </a:txBody>
+                  <a:tcPr>
+                    <a:lnL w="12700" cap="flat" cmpd="sng" algn="ctr">
+                      <a:solidFill>
+                        <a:schemeClr val="tx1"/>
+                      </a:solidFill>
+                      <a:prstDash val="solid"/>
+                      <a:round/>
+                      <a:headEnd type="none" w="med" len="med"/>
+                      <a:tailEnd type="none" w="med" len="med"/>
+                    </a:lnL>
+                    <a:lnR w="12700" cap="flat" cmpd="sng" algn="ctr">
+                      <a:solidFill>
+                        <a:schemeClr val="tx1"/>
+                      </a:solidFill>
+                      <a:prstDash val="solid"/>
+                      <a:round/>
+                      <a:headEnd type="none" w="med" len="med"/>
+                      <a:tailEnd type="none" w="med" len="med"/>
+                    </a:lnR>
+                    <a:lnT w="12700" cap="flat" cmpd="sng" algn="ctr">
+                      <a:solidFill>
+                        <a:schemeClr val="tx1"/>
+                      </a:solidFill>
+                      <a:prstDash val="solid"/>
+                      <a:round/>
+                      <a:headEnd type="none" w="med" len="med"/>
+                      <a:tailEnd type="none" w="med" len="med"/>
+                    </a:lnT>
+                    <a:lnB w="12700" cap="flat" cmpd="sng" algn="ctr">
+                      <a:solidFill>
+                        <a:schemeClr val="tx1"/>
+                      </a:solidFill>
+                      <a:prstDash val="solid"/>
+                      <a:round/>
+                      <a:headEnd type="none" w="med" len="med"/>
+                      <a:tailEnd type="none" w="med" len="med"/>
+                    </a:lnB>
+                    <a:solidFill>
+                      <a:srgbClr val="FFFF00"/>
+                    </a:solidFill>
+                  </a:tcPr>
+                </a:tc>
+                <a:extLst>
+                  <a:ext uri="{0D108BD9-81ED-4DB2-BD59-A6C34878D82A}">
+                    <a16:rowId xmlns:a16="http://schemas.microsoft.com/office/drawing/2014/main" val="1242600548"/>
+                  </a:ext>
+                </a:extLst>
+              </a:tr>
+              <a:tr h="370840">
+                <a:tc>
+                  <a:txBody>
+                    <a:bodyPr/>
+                    <a:lstStyle/>
+                    <a:p>
+                      <a:pPr algn="ctr"/>
+                      <a:r>
+                        <a:rPr lang="en-US" dirty="0">
+                          <a:solidFill>
+                            <a:schemeClr val="tx1"/>
+                          </a:solidFill>
+                          <a:latin typeface="Times New Roman" panose="02020603050405020304" pitchFamily="18" charset="0"/>
+                          <a:cs typeface="Times New Roman" panose="02020603050405020304" pitchFamily="18" charset="0"/>
+                        </a:rPr>
+                        <a:t>1</a:t>
+                      </a:r>
+                    </a:p>
+                  </a:txBody>
+                  <a:tcPr>
+                    <a:lnL w="12700" cap="flat" cmpd="sng" algn="ctr">
+                      <a:solidFill>
+                        <a:schemeClr val="tx1"/>
+                      </a:solidFill>
+                      <a:prstDash val="solid"/>
+                      <a:round/>
+                      <a:headEnd type="none" w="med" len="med"/>
+                      <a:tailEnd type="none" w="med" len="med"/>
+                    </a:lnL>
+                    <a:lnR w="12700" cap="flat" cmpd="sng" algn="ctr">
+                      <a:solidFill>
+                        <a:schemeClr val="tx1"/>
+                      </a:solidFill>
+                      <a:prstDash val="solid"/>
+                      <a:round/>
+                      <a:headEnd type="none" w="med" len="med"/>
+                      <a:tailEnd type="none" w="med" len="med"/>
+                    </a:lnR>
+                    <a:lnT w="12700" cap="flat" cmpd="sng" algn="ctr">
+                      <a:solidFill>
+                        <a:schemeClr val="tx1"/>
+                      </a:solidFill>
+                      <a:prstDash val="solid"/>
+                      <a:round/>
+                      <a:headEnd type="none" w="med" len="med"/>
+                      <a:tailEnd type="none" w="med" len="med"/>
+                    </a:lnT>
+                    <a:lnB w="12700" cap="flat" cmpd="sng" algn="ctr">
+                      <a:solidFill>
+                        <a:schemeClr val="tx1"/>
+                      </a:solidFill>
+                      <a:prstDash val="solid"/>
+                      <a:round/>
+                      <a:headEnd type="none" w="med" len="med"/>
+                      <a:tailEnd type="none" w="med" len="med"/>
+                    </a:lnB>
+                    <a:noFill/>
+                  </a:tcPr>
+                </a:tc>
+                <a:tc>
+                  <a:txBody>
+                    <a:bodyPr/>
+                    <a:lstStyle/>
+                    <a:p>
+                      <a:pPr algn="ctr"/>
+                      <a:r>
+                        <a:rPr lang="en-US" dirty="0">
+                          <a:solidFill>
+                            <a:schemeClr val="tx1"/>
+                          </a:solidFill>
+                          <a:latin typeface="Times New Roman" panose="02020603050405020304" pitchFamily="18" charset="0"/>
+                          <a:cs typeface="Times New Roman" panose="02020603050405020304" pitchFamily="18" charset="0"/>
+                        </a:rPr>
+                        <a:t>Yellow</a:t>
+                      </a:r>
+                    </a:p>
+                  </a:txBody>
+                  <a:tcPr>
+                    <a:lnL w="12700" cap="flat" cmpd="sng" algn="ctr">
+                      <a:solidFill>
+                        <a:schemeClr val="tx1"/>
+                      </a:solidFill>
+                      <a:prstDash val="solid"/>
+                      <a:round/>
+                      <a:headEnd type="none" w="med" len="med"/>
+                      <a:tailEnd type="none" w="med" len="med"/>
+                    </a:lnL>
+                    <a:lnR w="12700" cap="flat" cmpd="sng" algn="ctr">
+                      <a:solidFill>
+                        <a:schemeClr val="tx1"/>
+                      </a:solidFill>
+                      <a:prstDash val="solid"/>
+                      <a:round/>
+                      <a:headEnd type="none" w="med" len="med"/>
+                      <a:tailEnd type="none" w="med" len="med"/>
+                    </a:lnR>
+                    <a:lnT w="12700" cap="flat" cmpd="sng" algn="ctr">
+                      <a:solidFill>
+                        <a:schemeClr val="tx1"/>
+                      </a:solidFill>
+                      <a:prstDash val="solid"/>
+                      <a:round/>
+                      <a:headEnd type="none" w="med" len="med"/>
+                      <a:tailEnd type="none" w="med" len="med"/>
+                    </a:lnT>
+                    <a:lnB w="12700" cap="flat" cmpd="sng" algn="ctr">
+                      <a:solidFill>
+                        <a:schemeClr val="tx1"/>
+                      </a:solidFill>
+                      <a:prstDash val="solid"/>
+                      <a:round/>
+                      <a:headEnd type="none" w="med" len="med"/>
+                      <a:tailEnd type="none" w="med" len="med"/>
+                    </a:lnB>
+                    <a:solidFill>
+                      <a:srgbClr val="FFFF00"/>
+                    </a:solidFill>
+                  </a:tcPr>
+                </a:tc>
+                <a:tc>
+                  <a:txBody>
+                    <a:bodyPr/>
+                    <a:lstStyle/>
+                    <a:p>
+                      <a:pPr algn="ctr"/>
+                      <a:r>
+                        <a:rPr lang="en-US" dirty="0">
+                          <a:solidFill>
+                            <a:schemeClr val="tx1"/>
+                          </a:solidFill>
+                          <a:latin typeface="Times New Roman" panose="02020603050405020304" pitchFamily="18" charset="0"/>
+                          <a:cs typeface="Times New Roman" panose="02020603050405020304" pitchFamily="18" charset="0"/>
+                        </a:rPr>
+                        <a:t>Yellow</a:t>
+                      </a:r>
+                    </a:p>
+                  </a:txBody>
+                  <a:tcPr>
+                    <a:lnL w="12700" cap="flat" cmpd="sng" algn="ctr">
+                      <a:solidFill>
+                        <a:schemeClr val="tx1"/>
+                      </a:solidFill>
+                      <a:prstDash val="solid"/>
+                      <a:round/>
+                      <a:headEnd type="none" w="med" len="med"/>
+                      <a:tailEnd type="none" w="med" len="med"/>
+                    </a:lnL>
+                    <a:lnR w="12700" cap="flat" cmpd="sng" algn="ctr">
+                      <a:solidFill>
+                        <a:schemeClr val="tx1"/>
+                      </a:solidFill>
+                      <a:prstDash val="solid"/>
+                      <a:round/>
+                      <a:headEnd type="none" w="med" len="med"/>
+                      <a:tailEnd type="none" w="med" len="med"/>
+                    </a:lnR>
+                    <a:lnT w="12700" cap="flat" cmpd="sng" algn="ctr">
+                      <a:solidFill>
+                        <a:schemeClr val="tx1"/>
+                      </a:solidFill>
+                      <a:prstDash val="solid"/>
+                      <a:round/>
+                      <a:headEnd type="none" w="med" len="med"/>
+                      <a:tailEnd type="none" w="med" len="med"/>
+                    </a:lnT>
+                    <a:lnB w="12700" cap="flat" cmpd="sng" algn="ctr">
+                      <a:solidFill>
+                        <a:schemeClr val="tx1"/>
+                      </a:solidFill>
+                      <a:prstDash val="solid"/>
+                      <a:round/>
+                      <a:headEnd type="none" w="med" len="med"/>
+                      <a:tailEnd type="none" w="med" len="med"/>
+                    </a:lnB>
+                    <a:solidFill>
+                      <a:srgbClr val="FFFF00"/>
+                    </a:solidFill>
+                  </a:tcPr>
+                </a:tc>
+                <a:tc>
+                  <a:txBody>
+                    <a:bodyPr/>
+                    <a:lstStyle/>
+                    <a:p>
+                      <a:pPr algn="ctr"/>
+                      <a:r>
+                        <a:rPr lang="en-US" dirty="0">
+                          <a:solidFill>
+                            <a:schemeClr val="tx1"/>
+                          </a:solidFill>
+                          <a:latin typeface="Times New Roman" panose="02020603050405020304" pitchFamily="18" charset="0"/>
+                          <a:cs typeface="Times New Roman" panose="02020603050405020304" pitchFamily="18" charset="0"/>
+                        </a:rPr>
+                        <a:t>Yellow</a:t>
+                      </a:r>
+                    </a:p>
+                  </a:txBody>
+                  <a:tcPr>
+                    <a:lnL w="12700" cap="flat" cmpd="sng" algn="ctr">
+                      <a:solidFill>
+                        <a:schemeClr val="tx1"/>
+                      </a:solidFill>
+                      <a:prstDash val="solid"/>
+                      <a:round/>
+                      <a:headEnd type="none" w="med" len="med"/>
+                      <a:tailEnd type="none" w="med" len="med"/>
+                    </a:lnL>
+                    <a:lnR w="12700" cap="flat" cmpd="sng" algn="ctr">
+                      <a:solidFill>
+                        <a:schemeClr val="tx1"/>
+                      </a:solidFill>
+                      <a:prstDash val="solid"/>
+                      <a:round/>
+                      <a:headEnd type="none" w="med" len="med"/>
+                      <a:tailEnd type="none" w="med" len="med"/>
+                    </a:lnR>
+                    <a:lnT w="12700" cap="flat" cmpd="sng" algn="ctr">
+                      <a:solidFill>
+                        <a:schemeClr val="tx1"/>
+                      </a:solidFill>
+                      <a:prstDash val="solid"/>
+                      <a:round/>
+                      <a:headEnd type="none" w="med" len="med"/>
+                      <a:tailEnd type="none" w="med" len="med"/>
+                    </a:lnT>
+                    <a:lnB w="12700" cap="flat" cmpd="sng" algn="ctr">
+                      <a:solidFill>
+                        <a:schemeClr val="tx1"/>
+                      </a:solidFill>
+                      <a:prstDash val="solid"/>
+                      <a:round/>
+                      <a:headEnd type="none" w="med" len="med"/>
+                      <a:tailEnd type="none" w="med" len="med"/>
+                    </a:lnB>
+                    <a:solidFill>
+                      <a:srgbClr val="FFFF00"/>
+                    </a:solidFill>
+                  </a:tcPr>
+                </a:tc>
+                <a:tc>
+                  <a:txBody>
+                    <a:bodyPr/>
+                    <a:lstStyle/>
+                    <a:p>
+                      <a:pPr algn="ctr"/>
+                      <a:r>
+                        <a:rPr lang="en-US" dirty="0">
+                          <a:solidFill>
+                            <a:schemeClr val="tx1"/>
+                          </a:solidFill>
+                          <a:latin typeface="Times New Roman" panose="02020603050405020304" pitchFamily="18" charset="0"/>
+                          <a:cs typeface="Times New Roman" panose="02020603050405020304" pitchFamily="18" charset="0"/>
+                        </a:rPr>
+                        <a:t>Red</a:t>
+                      </a:r>
+                    </a:p>
+                  </a:txBody>
+                  <a:tcPr>
+                    <a:lnL w="12700" cap="flat" cmpd="sng" algn="ctr">
+                      <a:solidFill>
+                        <a:schemeClr val="tx1"/>
+                      </a:solidFill>
+                      <a:prstDash val="solid"/>
+                      <a:round/>
+                      <a:headEnd type="none" w="med" len="med"/>
+                      <a:tailEnd type="none" w="med" len="med"/>
+                    </a:lnL>
+                    <a:lnR w="12700" cap="flat" cmpd="sng" algn="ctr">
+                      <a:solidFill>
+                        <a:schemeClr val="tx1"/>
+                      </a:solidFill>
+                      <a:prstDash val="solid"/>
+                      <a:round/>
+                      <a:headEnd type="none" w="med" len="med"/>
+                      <a:tailEnd type="none" w="med" len="med"/>
+                    </a:lnR>
+                    <a:lnT w="12700" cap="flat" cmpd="sng" algn="ctr">
+                      <a:solidFill>
+                        <a:schemeClr val="tx1"/>
+                      </a:solidFill>
+                      <a:prstDash val="solid"/>
+                      <a:round/>
+                      <a:headEnd type="none" w="med" len="med"/>
+                      <a:tailEnd type="none" w="med" len="med"/>
+                    </a:lnT>
+                    <a:lnB w="12700" cap="flat" cmpd="sng" algn="ctr">
+                      <a:solidFill>
+                        <a:schemeClr val="tx1"/>
+                      </a:solidFill>
+                      <a:prstDash val="solid"/>
+                      <a:round/>
+                      <a:headEnd type="none" w="med" len="med"/>
+                      <a:tailEnd type="none" w="med" len="med"/>
+                    </a:lnB>
+                    <a:solidFill>
+                      <a:srgbClr val="FF0000"/>
+                    </a:solidFill>
+                  </a:tcPr>
+                </a:tc>
+                <a:extLst>
+                  <a:ext uri="{0D108BD9-81ED-4DB2-BD59-A6C34878D82A}">
+                    <a16:rowId xmlns:a16="http://schemas.microsoft.com/office/drawing/2014/main" val="872763259"/>
+                  </a:ext>
+                </a:extLst>
+              </a:tr>
+              <a:tr h="185420">
+                <a:tc>
+                  <a:txBody>
+                    <a:bodyPr/>
+                    <a:lstStyle/>
+                    <a:p>
+                      <a:pPr algn="ctr"/>
+                      <a:r>
+                        <a:rPr lang="en-US" dirty="0">
+                          <a:solidFill>
+                            <a:schemeClr val="tx1"/>
+                          </a:solidFill>
+                          <a:latin typeface="Times New Roman" panose="02020603050405020304" pitchFamily="18" charset="0"/>
+                          <a:cs typeface="Times New Roman" panose="02020603050405020304" pitchFamily="18" charset="0"/>
+                        </a:rPr>
+                        <a:t>2</a:t>
+                      </a:r>
+                    </a:p>
+                  </a:txBody>
+                  <a:tcPr>
+                    <a:lnL w="12700" cap="flat" cmpd="sng" algn="ctr">
+                      <a:solidFill>
+                        <a:schemeClr val="tx1"/>
+                      </a:solidFill>
+                      <a:prstDash val="solid"/>
+                      <a:round/>
+                      <a:headEnd type="none" w="med" len="med"/>
+                      <a:tailEnd type="none" w="med" len="med"/>
+                    </a:lnL>
+                    <a:lnR w="12700" cap="flat" cmpd="sng" algn="ctr">
+                      <a:solidFill>
+                        <a:schemeClr val="tx1"/>
+                      </a:solidFill>
+                      <a:prstDash val="solid"/>
+                      <a:round/>
+                      <a:headEnd type="none" w="med" len="med"/>
+                      <a:tailEnd type="none" w="med" len="med"/>
+                    </a:lnR>
+                    <a:lnT w="12700" cap="flat" cmpd="sng" algn="ctr">
+                      <a:solidFill>
+                        <a:schemeClr val="tx1"/>
+                      </a:solidFill>
+                      <a:prstDash val="solid"/>
+                      <a:round/>
+                      <a:headEnd type="none" w="med" len="med"/>
+                      <a:tailEnd type="none" w="med" len="med"/>
+                    </a:lnT>
+                    <a:lnB w="12700" cap="flat" cmpd="sng" algn="ctr">
+                      <a:solidFill>
+                        <a:schemeClr val="tx1"/>
+                      </a:solidFill>
+                      <a:prstDash val="solid"/>
+                      <a:round/>
+                      <a:headEnd type="none" w="med" len="med"/>
+                      <a:tailEnd type="none" w="med" len="med"/>
+                    </a:lnB>
+                    <a:lnTlToBr w="12700" cmpd="sng">
+                      <a:noFill/>
+                      <a:prstDash val="solid"/>
+                    </a:lnTlToBr>
+                    <a:lnBlToTr w="12700" cmpd="sng">
+                      <a:noFill/>
+                      <a:prstDash val="solid"/>
+                    </a:lnBlToTr>
+                    <a:noFill/>
+                  </a:tcPr>
+                </a:tc>
+                <a:tc>
+                  <a:txBody>
+                    <a:bodyPr/>
+                    <a:lstStyle/>
+                    <a:p>
+                      <a:pPr marL="0" marR="0" lvl="0" indent="0" algn="ctr" defTabSz="914400" rtl="0" eaLnBrk="1" fontAlgn="auto" latinLnBrk="0" hangingPunct="1">
+                        <a:lnSpc>
+                          <a:spcPct val="100000"/>
+                        </a:lnSpc>
+                        <a:spcBef>
+                          <a:spcPts val="0"/>
+                        </a:spcBef>
+                        <a:spcAft>
+                          <a:spcPts val="0"/>
+                        </a:spcAft>
+                        <a:buClrTx/>
+                        <a:buSzTx/>
+                        <a:buFontTx/>
+                        <a:buNone/>
+                        <a:tabLst/>
+                        <a:defRPr/>
+                      </a:pPr>
+                      <a:r>
+                        <a:rPr lang="en-US" dirty="0">
+                          <a:solidFill>
+                            <a:schemeClr val="tx1"/>
+                          </a:solidFill>
+                          <a:latin typeface="Times New Roman" panose="02020603050405020304" pitchFamily="18" charset="0"/>
+                          <a:cs typeface="Times New Roman" panose="02020603050405020304" pitchFamily="18" charset="0"/>
+                        </a:rPr>
+                        <a:t>Yellow</a:t>
+                      </a:r>
+                    </a:p>
+                  </a:txBody>
+                  <a:tcPr>
+                    <a:lnL w="12700" cap="flat" cmpd="sng" algn="ctr">
+                      <a:solidFill>
+                        <a:schemeClr val="tx1"/>
+                      </a:solidFill>
+                      <a:prstDash val="solid"/>
+                      <a:round/>
+                      <a:headEnd type="none" w="med" len="med"/>
+                      <a:tailEnd type="none" w="med" len="med"/>
+                    </a:lnL>
+                    <a:lnR w="12700" cap="flat" cmpd="sng" algn="ctr">
+                      <a:solidFill>
+                        <a:schemeClr val="tx1"/>
+                      </a:solidFill>
+                      <a:prstDash val="solid"/>
+                      <a:round/>
+                      <a:headEnd type="none" w="med" len="med"/>
+                      <a:tailEnd type="none" w="med" len="med"/>
+                    </a:lnR>
+                    <a:lnT w="12700" cap="flat" cmpd="sng" algn="ctr">
+                      <a:solidFill>
+                        <a:schemeClr val="tx1"/>
+                      </a:solidFill>
+                      <a:prstDash val="solid"/>
+                      <a:round/>
+                      <a:headEnd type="none" w="med" len="med"/>
+                      <a:tailEnd type="none" w="med" len="med"/>
+                    </a:lnT>
+                    <a:lnB w="12700" cap="flat" cmpd="sng" algn="ctr">
+                      <a:solidFill>
+                        <a:schemeClr val="tx1"/>
+                      </a:solidFill>
+                      <a:prstDash val="solid"/>
+                      <a:round/>
+                      <a:headEnd type="none" w="med" len="med"/>
+                      <a:tailEnd type="none" w="med" len="med"/>
+                    </a:lnB>
+                    <a:lnTlToBr w="12700" cmpd="sng">
+                      <a:noFill/>
+                      <a:prstDash val="solid"/>
+                    </a:lnTlToBr>
+                    <a:lnBlToTr w="12700" cmpd="sng">
+                      <a:noFill/>
+                      <a:prstDash val="solid"/>
+                    </a:lnBlToTr>
+                    <a:solidFill>
+                      <a:srgbClr val="FFFF00"/>
+                    </a:solidFill>
+                  </a:tcPr>
+                </a:tc>
+                <a:tc>
+                  <a:txBody>
+                    <a:bodyPr/>
+                    <a:lstStyle/>
+                    <a:p>
+                      <a:pPr algn="ctr"/>
+                      <a:r>
+                        <a:rPr lang="en-US" dirty="0">
+                          <a:solidFill>
+                            <a:schemeClr val="tx1"/>
+                          </a:solidFill>
+                          <a:latin typeface="Times New Roman" panose="02020603050405020304" pitchFamily="18" charset="0"/>
+                          <a:cs typeface="Times New Roman" panose="02020603050405020304" pitchFamily="18" charset="0"/>
+                        </a:rPr>
+                        <a:t>Yellow</a:t>
+                      </a:r>
+                    </a:p>
+                  </a:txBody>
+                  <a:tcPr>
+                    <a:lnL w="12700" cap="flat" cmpd="sng" algn="ctr">
+                      <a:solidFill>
+                        <a:schemeClr val="tx1"/>
+                      </a:solidFill>
+                      <a:prstDash val="solid"/>
+                      <a:round/>
+                      <a:headEnd type="none" w="med" len="med"/>
+                      <a:tailEnd type="none" w="med" len="med"/>
+                    </a:lnL>
+                    <a:lnR w="12700" cap="flat" cmpd="sng" algn="ctr">
+                      <a:solidFill>
+                        <a:schemeClr val="tx1"/>
+                      </a:solidFill>
+                      <a:prstDash val="solid"/>
+                      <a:round/>
+                      <a:headEnd type="none" w="med" len="med"/>
+                      <a:tailEnd type="none" w="med" len="med"/>
+                    </a:lnR>
+                    <a:lnT w="12700" cap="flat" cmpd="sng" algn="ctr">
+                      <a:solidFill>
+                        <a:schemeClr val="tx1"/>
+                      </a:solidFill>
+                      <a:prstDash val="solid"/>
+                      <a:round/>
+                      <a:headEnd type="none" w="med" len="med"/>
+                      <a:tailEnd type="none" w="med" len="med"/>
+                    </a:lnT>
+                    <a:lnB w="12700" cap="flat" cmpd="sng" algn="ctr">
+                      <a:solidFill>
+                        <a:schemeClr val="tx1"/>
+                      </a:solidFill>
+                      <a:prstDash val="solid"/>
+                      <a:round/>
+                      <a:headEnd type="none" w="med" len="med"/>
+                      <a:tailEnd type="none" w="med" len="med"/>
+                    </a:lnB>
+                    <a:lnTlToBr w="12700" cmpd="sng">
+                      <a:noFill/>
+                      <a:prstDash val="solid"/>
+                    </a:lnTlToBr>
+                    <a:lnBlToTr w="12700" cmpd="sng">
+                      <a:noFill/>
+                      <a:prstDash val="solid"/>
+                    </a:lnBlToTr>
+                    <a:solidFill>
+                      <a:srgbClr val="FFFF00"/>
+                    </a:solidFill>
+                  </a:tcPr>
+                </a:tc>
+                <a:tc>
+                  <a:txBody>
+                    <a:bodyPr/>
+                    <a:lstStyle/>
+                    <a:p>
+                      <a:pPr algn="ctr"/>
+                      <a:r>
+                        <a:rPr lang="en-US" dirty="0">
+                          <a:solidFill>
+                            <a:schemeClr val="tx1"/>
+                          </a:solidFill>
+                          <a:latin typeface="Times New Roman" panose="02020603050405020304" pitchFamily="18" charset="0"/>
+                          <a:cs typeface="Times New Roman" panose="02020603050405020304" pitchFamily="18" charset="0"/>
+                        </a:rPr>
+                        <a:t>Red</a:t>
+                      </a:r>
+                    </a:p>
+                  </a:txBody>
+                  <a:tcPr>
+                    <a:lnL w="12700" cap="flat" cmpd="sng" algn="ctr">
+                      <a:solidFill>
+                        <a:schemeClr val="tx1"/>
+                      </a:solidFill>
+                      <a:prstDash val="solid"/>
+                      <a:round/>
+                      <a:headEnd type="none" w="med" len="med"/>
+                      <a:tailEnd type="none" w="med" len="med"/>
+                    </a:lnL>
+                    <a:lnR w="12700" cap="flat" cmpd="sng" algn="ctr">
+                      <a:solidFill>
+                        <a:schemeClr val="tx1"/>
+                      </a:solidFill>
+                      <a:prstDash val="solid"/>
+                      <a:round/>
+                      <a:headEnd type="none" w="med" len="med"/>
+                      <a:tailEnd type="none" w="med" len="med"/>
+                    </a:lnR>
+                    <a:lnT w="12700" cap="flat" cmpd="sng" algn="ctr">
+                      <a:solidFill>
+                        <a:schemeClr val="tx1"/>
+                      </a:solidFill>
+                      <a:prstDash val="solid"/>
+                      <a:round/>
+                      <a:headEnd type="none" w="med" len="med"/>
+                      <a:tailEnd type="none" w="med" len="med"/>
+                    </a:lnT>
+                    <a:lnB w="12700" cap="flat" cmpd="sng" algn="ctr">
+                      <a:solidFill>
+                        <a:schemeClr val="tx1"/>
+                      </a:solidFill>
+                      <a:prstDash val="solid"/>
+                      <a:round/>
+                      <a:headEnd type="none" w="med" len="med"/>
+                      <a:tailEnd type="none" w="med" len="med"/>
+                    </a:lnB>
+                    <a:lnTlToBr w="12700" cmpd="sng">
+                      <a:noFill/>
+                      <a:prstDash val="solid"/>
+                    </a:lnTlToBr>
+                    <a:lnBlToTr w="12700" cmpd="sng">
+                      <a:noFill/>
+                      <a:prstDash val="solid"/>
+                    </a:lnBlToTr>
+                    <a:solidFill>
+                      <a:srgbClr val="FF0000"/>
+                    </a:solidFill>
+                  </a:tcPr>
+                </a:tc>
+                <a:tc>
+                  <a:txBody>
+                    <a:bodyPr/>
+                    <a:lstStyle/>
+                    <a:p>
+                      <a:pPr algn="ctr"/>
+                      <a:r>
+                        <a:rPr lang="en-US" dirty="0">
+                          <a:solidFill>
+                            <a:schemeClr val="tx1"/>
+                          </a:solidFill>
+                          <a:latin typeface="Times New Roman" panose="02020603050405020304" pitchFamily="18" charset="0"/>
+                          <a:cs typeface="Times New Roman" panose="02020603050405020304" pitchFamily="18" charset="0"/>
+                        </a:rPr>
+                        <a:t>Red</a:t>
+                      </a:r>
+                    </a:p>
+                  </a:txBody>
+                  <a:tcPr>
+                    <a:lnL w="12700" cap="flat" cmpd="sng" algn="ctr">
+                      <a:solidFill>
+                        <a:schemeClr val="tx1"/>
+                      </a:solidFill>
+                      <a:prstDash val="solid"/>
+                      <a:round/>
+                      <a:headEnd type="none" w="med" len="med"/>
+                      <a:tailEnd type="none" w="med" len="med"/>
+                    </a:lnL>
+                    <a:lnR w="12700" cap="flat" cmpd="sng" algn="ctr">
+                      <a:solidFill>
+                        <a:schemeClr val="tx1"/>
+                      </a:solidFill>
+                      <a:prstDash val="solid"/>
+                      <a:round/>
+                      <a:headEnd type="none" w="med" len="med"/>
+                      <a:tailEnd type="none" w="med" len="med"/>
+                    </a:lnR>
+                    <a:lnT w="12700" cap="flat" cmpd="sng" algn="ctr">
+                      <a:solidFill>
+                        <a:schemeClr val="tx1"/>
+                      </a:solidFill>
+                      <a:prstDash val="solid"/>
+                      <a:round/>
+                      <a:headEnd type="none" w="med" len="med"/>
+                      <a:tailEnd type="none" w="med" len="med"/>
+                    </a:lnT>
+                    <a:lnB w="12700" cap="flat" cmpd="sng" algn="ctr">
+                      <a:solidFill>
+                        <a:schemeClr val="tx1"/>
+                      </a:solidFill>
+                      <a:prstDash val="solid"/>
+                      <a:round/>
+                      <a:headEnd type="none" w="med" len="med"/>
+                      <a:tailEnd type="none" w="med" len="med"/>
+                    </a:lnB>
+                    <a:lnTlToBr w="12700" cmpd="sng">
+                      <a:noFill/>
+                      <a:prstDash val="solid"/>
+                    </a:lnTlToBr>
+                    <a:lnBlToTr w="12700" cmpd="sng">
+                      <a:noFill/>
+                      <a:prstDash val="solid"/>
+                    </a:lnBlToTr>
+                    <a:solidFill>
+                      <a:srgbClr val="FF0000"/>
+                    </a:solidFill>
+                  </a:tcPr>
+                </a:tc>
+                <a:extLst>
+                  <a:ext uri="{0D108BD9-81ED-4DB2-BD59-A6C34878D82A}">
+                    <a16:rowId xmlns:a16="http://schemas.microsoft.com/office/drawing/2014/main" val="1198176204"/>
+                  </a:ext>
+                </a:extLst>
+              </a:tr>
+              <a:tr h="185420">
+                <a:tc>
+                  <a:txBody>
+                    <a:bodyPr/>
+                    <a:lstStyle/>
+                    <a:p>
+                      <a:pPr algn="ctr"/>
+                      <a:r>
+                        <a:rPr lang="en-US" dirty="0">
+                          <a:solidFill>
+                            <a:schemeClr val="tx1"/>
+                          </a:solidFill>
+                          <a:latin typeface="Times New Roman" panose="02020603050405020304" pitchFamily="18" charset="0"/>
+                          <a:cs typeface="Times New Roman" panose="02020603050405020304" pitchFamily="18" charset="0"/>
+                        </a:rPr>
+                        <a:t>3</a:t>
+                      </a:r>
+                    </a:p>
+                  </a:txBody>
+                  <a:tcPr>
+                    <a:lnL w="12700" cap="flat" cmpd="sng" algn="ctr">
+                      <a:solidFill>
+                        <a:schemeClr val="tx1"/>
+                      </a:solidFill>
+                      <a:prstDash val="solid"/>
+                      <a:round/>
+                      <a:headEnd type="none" w="med" len="med"/>
+                      <a:tailEnd type="none" w="med" len="med"/>
+                    </a:lnL>
+                    <a:lnR w="12700" cap="flat" cmpd="sng" algn="ctr">
+                      <a:solidFill>
+                        <a:schemeClr val="tx1"/>
+                      </a:solidFill>
+                      <a:prstDash val="solid"/>
+                      <a:round/>
+                      <a:headEnd type="none" w="med" len="med"/>
+                      <a:tailEnd type="none" w="med" len="med"/>
+                    </a:lnR>
+                    <a:lnT w="12700" cap="flat" cmpd="sng" algn="ctr">
+                      <a:solidFill>
+                        <a:schemeClr val="tx1"/>
+                      </a:solidFill>
+                      <a:prstDash val="solid"/>
+                      <a:round/>
+                      <a:headEnd type="none" w="med" len="med"/>
+                      <a:tailEnd type="none" w="med" len="med"/>
+                    </a:lnT>
+                    <a:lnB w="12700" cap="flat" cmpd="sng" algn="ctr">
+                      <a:solidFill>
+                        <a:schemeClr val="tx1"/>
+                      </a:solidFill>
+                      <a:prstDash val="solid"/>
+                      <a:round/>
+                      <a:headEnd type="none" w="med" len="med"/>
+                      <a:tailEnd type="none" w="med" len="med"/>
+                    </a:lnB>
+                    <a:noFill/>
+                  </a:tcPr>
+                </a:tc>
+                <a:tc>
+                  <a:txBody>
+                    <a:bodyPr/>
+                    <a:lstStyle/>
+                    <a:p>
+                      <a:pPr marL="0" marR="0" lvl="0" indent="0" algn="ctr" defTabSz="914400" rtl="0" eaLnBrk="1" fontAlgn="auto" latinLnBrk="0" hangingPunct="1">
+                        <a:lnSpc>
+                          <a:spcPct val="100000"/>
+                        </a:lnSpc>
+                        <a:spcBef>
+                          <a:spcPts val="0"/>
+                        </a:spcBef>
+                        <a:spcAft>
+                          <a:spcPts val="0"/>
+                        </a:spcAft>
+                        <a:buClrTx/>
+                        <a:buSzTx/>
+                        <a:buFontTx/>
+                        <a:buNone/>
+                        <a:tabLst/>
+                        <a:defRPr/>
+                      </a:pPr>
+                      <a:r>
+                        <a:rPr lang="en-US" dirty="0">
+                          <a:solidFill>
+                            <a:schemeClr val="tx1"/>
+                          </a:solidFill>
+                          <a:latin typeface="Times New Roman" panose="02020603050405020304" pitchFamily="18" charset="0"/>
+                          <a:cs typeface="Times New Roman" panose="02020603050405020304" pitchFamily="18" charset="0"/>
+                        </a:rPr>
+                        <a:t>Yellow</a:t>
+                      </a:r>
+                    </a:p>
+                  </a:txBody>
+                  <a:tcPr>
+                    <a:lnL w="12700" cap="flat" cmpd="sng" algn="ctr">
+                      <a:solidFill>
+                        <a:schemeClr val="tx1"/>
+                      </a:solidFill>
+                      <a:prstDash val="solid"/>
+                      <a:round/>
+                      <a:headEnd type="none" w="med" len="med"/>
+                      <a:tailEnd type="none" w="med" len="med"/>
+                    </a:lnL>
+                    <a:lnR w="12700" cap="flat" cmpd="sng" algn="ctr">
+                      <a:solidFill>
+                        <a:schemeClr val="tx1"/>
+                      </a:solidFill>
+                      <a:prstDash val="solid"/>
+                      <a:round/>
+                      <a:headEnd type="none" w="med" len="med"/>
+                      <a:tailEnd type="none" w="med" len="med"/>
+                    </a:lnR>
+                    <a:lnT w="12700" cap="flat" cmpd="sng" algn="ctr">
+                      <a:solidFill>
+                        <a:schemeClr val="tx1"/>
+                      </a:solidFill>
+                      <a:prstDash val="solid"/>
+                      <a:round/>
+                      <a:headEnd type="none" w="med" len="med"/>
+                      <a:tailEnd type="none" w="med" len="med"/>
+                    </a:lnT>
+                    <a:lnB w="12700" cap="flat" cmpd="sng" algn="ctr">
+                      <a:solidFill>
+                        <a:schemeClr val="tx1"/>
+                      </a:solidFill>
+                      <a:prstDash val="solid"/>
+                      <a:round/>
+                      <a:headEnd type="none" w="med" len="med"/>
+                      <a:tailEnd type="none" w="med" len="med"/>
+                    </a:lnB>
+                    <a:solidFill>
+                      <a:srgbClr val="FFFF00"/>
+                    </a:solidFill>
+                  </a:tcPr>
+                </a:tc>
+                <a:tc>
+                  <a:txBody>
+                    <a:bodyPr/>
+                    <a:lstStyle/>
+                    <a:p>
+                      <a:pPr algn="ctr"/>
+                      <a:r>
+                        <a:rPr lang="en-US" dirty="0">
+                          <a:solidFill>
+                            <a:schemeClr val="tx1"/>
+                          </a:solidFill>
+                          <a:latin typeface="Times New Roman" panose="02020603050405020304" pitchFamily="18" charset="0"/>
+                          <a:cs typeface="Times New Roman" panose="02020603050405020304" pitchFamily="18" charset="0"/>
+                        </a:rPr>
+                        <a:t>Red</a:t>
+                      </a:r>
+                    </a:p>
+                  </a:txBody>
+                  <a:tcPr>
+                    <a:lnL w="12700" cap="flat" cmpd="sng" algn="ctr">
+                      <a:solidFill>
+                        <a:schemeClr val="tx1"/>
+                      </a:solidFill>
+                      <a:prstDash val="solid"/>
+                      <a:round/>
+                      <a:headEnd type="none" w="med" len="med"/>
+                      <a:tailEnd type="none" w="med" len="med"/>
+                    </a:lnL>
+                    <a:lnR w="12700" cap="flat" cmpd="sng" algn="ctr">
+                      <a:solidFill>
+                        <a:schemeClr val="tx1"/>
+                      </a:solidFill>
+                      <a:prstDash val="solid"/>
+                      <a:round/>
+                      <a:headEnd type="none" w="med" len="med"/>
+                      <a:tailEnd type="none" w="med" len="med"/>
+                    </a:lnR>
+                    <a:lnT w="12700" cap="flat" cmpd="sng" algn="ctr">
+                      <a:solidFill>
+                        <a:schemeClr val="tx1"/>
+                      </a:solidFill>
+                      <a:prstDash val="solid"/>
+                      <a:round/>
+                      <a:headEnd type="none" w="med" len="med"/>
+                      <a:tailEnd type="none" w="med" len="med"/>
+                    </a:lnT>
+                    <a:lnB w="12700" cap="flat" cmpd="sng" algn="ctr">
+                      <a:solidFill>
+                        <a:schemeClr val="tx1"/>
+                      </a:solidFill>
+                      <a:prstDash val="solid"/>
+                      <a:round/>
+                      <a:headEnd type="none" w="med" len="med"/>
+                      <a:tailEnd type="none" w="med" len="med"/>
+                    </a:lnB>
+                    <a:solidFill>
+                      <a:srgbClr val="FF0000"/>
+                    </a:solidFill>
+                  </a:tcPr>
+                </a:tc>
+                <a:tc>
+                  <a:txBody>
+                    <a:bodyPr/>
+                    <a:lstStyle/>
+                    <a:p>
+                      <a:pPr algn="ctr"/>
+                      <a:r>
+                        <a:rPr lang="en-US" dirty="0">
+                          <a:solidFill>
+                            <a:schemeClr val="tx1"/>
+                          </a:solidFill>
+                          <a:latin typeface="Times New Roman" panose="02020603050405020304" pitchFamily="18" charset="0"/>
+                          <a:cs typeface="Times New Roman" panose="02020603050405020304" pitchFamily="18" charset="0"/>
+                        </a:rPr>
+                        <a:t>Red</a:t>
+                      </a:r>
+                    </a:p>
+                  </a:txBody>
+                  <a:tcPr>
+                    <a:lnL w="12700" cap="flat" cmpd="sng" algn="ctr">
+                      <a:solidFill>
+                        <a:schemeClr val="tx1"/>
+                      </a:solidFill>
+                      <a:prstDash val="solid"/>
+                      <a:round/>
+                      <a:headEnd type="none" w="med" len="med"/>
+                      <a:tailEnd type="none" w="med" len="med"/>
+                    </a:lnL>
+                    <a:lnR w="12700" cap="flat" cmpd="sng" algn="ctr">
+                      <a:solidFill>
+                        <a:schemeClr val="tx1"/>
+                      </a:solidFill>
+                      <a:prstDash val="solid"/>
+                      <a:round/>
+                      <a:headEnd type="none" w="med" len="med"/>
+                      <a:tailEnd type="none" w="med" len="med"/>
+                    </a:lnR>
+                    <a:lnT w="12700" cap="flat" cmpd="sng" algn="ctr">
+                      <a:solidFill>
+                        <a:schemeClr val="tx1"/>
+                      </a:solidFill>
+                      <a:prstDash val="solid"/>
+                      <a:round/>
+                      <a:headEnd type="none" w="med" len="med"/>
+                      <a:tailEnd type="none" w="med" len="med"/>
+                    </a:lnT>
+                    <a:lnB w="12700" cap="flat" cmpd="sng" algn="ctr">
+                      <a:solidFill>
+                        <a:schemeClr val="tx1"/>
+                      </a:solidFill>
+                      <a:prstDash val="solid"/>
+                      <a:round/>
+                      <a:headEnd type="none" w="med" len="med"/>
+                      <a:tailEnd type="none" w="med" len="med"/>
+                    </a:lnB>
+                    <a:solidFill>
+                      <a:srgbClr val="FF0000"/>
+                    </a:solidFill>
+                  </a:tcPr>
+                </a:tc>
+                <a:tc>
+                  <a:txBody>
+                    <a:bodyPr/>
+                    <a:lstStyle/>
+                    <a:p>
+                      <a:pPr algn="ctr"/>
+                      <a:r>
+                        <a:rPr lang="en-US" dirty="0">
+                          <a:solidFill>
+                            <a:schemeClr val="tx1"/>
+                          </a:solidFill>
+                          <a:latin typeface="Times New Roman" panose="02020603050405020304" pitchFamily="18" charset="0"/>
+                          <a:cs typeface="Times New Roman" panose="02020603050405020304" pitchFamily="18" charset="0"/>
+                        </a:rPr>
+                        <a:t>Red</a:t>
+                      </a:r>
+                    </a:p>
+                  </a:txBody>
+                  <a:tcPr>
+                    <a:lnL w="12700" cap="flat" cmpd="sng" algn="ctr">
+                      <a:solidFill>
+                        <a:schemeClr val="tx1"/>
+                      </a:solidFill>
+                      <a:prstDash val="solid"/>
+                      <a:round/>
+                      <a:headEnd type="none" w="med" len="med"/>
+                      <a:tailEnd type="none" w="med" len="med"/>
+                    </a:lnL>
+                    <a:lnR w="12700" cap="flat" cmpd="sng" algn="ctr">
+                      <a:solidFill>
+                        <a:schemeClr val="tx1"/>
+                      </a:solidFill>
+                      <a:prstDash val="solid"/>
+                      <a:round/>
+                      <a:headEnd type="none" w="med" len="med"/>
+                      <a:tailEnd type="none" w="med" len="med"/>
+                    </a:lnR>
+                    <a:lnT w="12700" cap="flat" cmpd="sng" algn="ctr">
+                      <a:solidFill>
+                        <a:schemeClr val="tx1"/>
+                      </a:solidFill>
+                      <a:prstDash val="solid"/>
+                      <a:round/>
+                      <a:headEnd type="none" w="med" len="med"/>
+                      <a:tailEnd type="none" w="med" len="med"/>
+                    </a:lnT>
+                    <a:lnB w="12700" cap="flat" cmpd="sng" algn="ctr">
+                      <a:solidFill>
+                        <a:schemeClr val="tx1"/>
+                      </a:solidFill>
+                      <a:prstDash val="solid"/>
+                      <a:round/>
+                      <a:headEnd type="none" w="med" len="med"/>
+                      <a:tailEnd type="none" w="med" len="med"/>
+                    </a:lnB>
+                    <a:solidFill>
+                      <a:srgbClr val="FF0000"/>
+                    </a:solidFill>
+                  </a:tcPr>
+                </a:tc>
+                <a:extLst>
+                  <a:ext uri="{0D108BD9-81ED-4DB2-BD59-A6C34878D82A}">
+                    <a16:rowId xmlns:a16="http://schemas.microsoft.com/office/drawing/2014/main" val="233637714"/>
+                  </a:ext>
+                </a:extLst>
+              </a:tr>
+            </a:tbl>
+          </a:graphicData>
+        </a:graphic>
+      </p:graphicFrame>
     </p:spTree>
     <p:extLst>
       <p:ext uri="{BB962C8B-B14F-4D97-AF65-F5344CB8AC3E}">

</xml_diff>